<commit_message>
updated the project status for 2017/12/08
</commit_message>
<xml_diff>
--- a/Document/CNTK_Project_Status_20171208.pptx
+++ b/Document/CNTK_Project_Status_20171208.pptx
@@ -5,12 +5,13 @@
     <p:sldMasterId id="2147483648" r:id="rId1"/>
   </p:sldMasterIdLst>
   <p:notesMasterIdLst>
-    <p:notesMasterId r:id="rId5"/>
+    <p:notesMasterId r:id="rId6"/>
   </p:notesMasterIdLst>
   <p:sldIdLst>
     <p:sldId id="256" r:id="rId2"/>
     <p:sldId id="257" r:id="rId3"/>
     <p:sldId id="271" r:id="rId4"/>
+    <p:sldId id="272" r:id="rId5"/>
   </p:sldIdLst>
   <p:sldSz cx="12192000" cy="6858000"/>
   <p:notesSz cx="6858000" cy="9144000"/>
@@ -203,7 +204,7 @@
           <a:p>
             <a:fld id="{0B2598F9-4ADA-4B51-B6CC-F76EAD98554E}" type="datetimeFigureOut">
               <a:rPr lang="en-US" smtClean="0"/>
-              <a:t>12/4/2017</a:t>
+              <a:t>12/7/2017</a:t>
             </a:fld>
             <a:endParaRPr lang="en-US"/>
           </a:p>
@@ -722,6 +723,90 @@
 </p:notes>
 </file>
 
+<file path=ppt/notesSlides/notesSlide4.xml><?xml version="1.0" encoding="utf-8"?>
+<p:notes xmlns:a="http://schemas.openxmlformats.org/drawingml/2006/main" xmlns:r="http://schemas.openxmlformats.org/officeDocument/2006/relationships" xmlns:p="http://schemas.openxmlformats.org/presentationml/2006/main">
+  <p:cSld>
+    <p:spTree>
+      <p:nvGrpSpPr>
+        <p:cNvPr id="1" name=""/>
+        <p:cNvGrpSpPr/>
+        <p:nvPr/>
+      </p:nvGrpSpPr>
+      <p:grpSpPr>
+        <a:xfrm>
+          <a:off x="0" y="0"/>
+          <a:ext cx="0" cy="0"/>
+          <a:chOff x="0" y="0"/>
+          <a:chExt cx="0" cy="0"/>
+        </a:xfrm>
+      </p:grpSpPr>
+      <p:sp>
+        <p:nvSpPr>
+          <p:cNvPr id="2" name="Slide Image Placeholder 1"/>
+          <p:cNvSpPr>
+            <a:spLocks noGrp="1" noRot="1" noChangeAspect="1"/>
+          </p:cNvSpPr>
+          <p:nvPr>
+            <p:ph type="sldImg"/>
+          </p:nvPr>
+        </p:nvSpPr>
+        <p:spPr/>
+      </p:sp>
+      <p:sp>
+        <p:nvSpPr>
+          <p:cNvPr id="3" name="Notes Placeholder 2"/>
+          <p:cNvSpPr>
+            <a:spLocks noGrp="1"/>
+          </p:cNvSpPr>
+          <p:nvPr>
+            <p:ph type="body" idx="1"/>
+          </p:nvPr>
+        </p:nvSpPr>
+        <p:spPr/>
+        <p:txBody>
+          <a:bodyPr/>
+          <a:lstStyle/>
+          <a:p>
+            <a:endParaRPr lang="en-US"/>
+          </a:p>
+        </p:txBody>
+      </p:sp>
+      <p:sp>
+        <p:nvSpPr>
+          <p:cNvPr id="4" name="Slide Number Placeholder 3"/>
+          <p:cNvSpPr>
+            <a:spLocks noGrp="1"/>
+          </p:cNvSpPr>
+          <p:nvPr>
+            <p:ph type="sldNum" sz="quarter" idx="10"/>
+          </p:nvPr>
+        </p:nvSpPr>
+        <p:spPr/>
+        <p:txBody>
+          <a:bodyPr/>
+          <a:lstStyle/>
+          <a:p>
+            <a:fld id="{ABEBCB03-436C-4D8F-97DD-0E8CF3A00739}" type="slidenum">
+              <a:rPr lang="en-US" smtClean="0"/>
+              <a:t>4</a:t>
+            </a:fld>
+            <a:endParaRPr lang="en-US"/>
+          </a:p>
+        </p:txBody>
+      </p:sp>
+    </p:spTree>
+    <p:extLst>
+      <p:ext uri="{BB962C8B-B14F-4D97-AF65-F5344CB8AC3E}">
+        <p14:creationId xmlns:p14="http://schemas.microsoft.com/office/powerpoint/2010/main" val="3655152650"/>
+      </p:ext>
+    </p:extLst>
+  </p:cSld>
+  <p:clrMapOvr>
+    <a:masterClrMapping/>
+  </p:clrMapOvr>
+</p:notes>
+</file>
+
 <file path=ppt/slideLayouts/slideLayout1.xml><?xml version="1.0" encoding="utf-8"?>
 <p:sldLayout xmlns:a="http://schemas.openxmlformats.org/drawingml/2006/main" xmlns:r="http://schemas.openxmlformats.org/officeDocument/2006/relationships" xmlns:p="http://schemas.openxmlformats.org/presentationml/2006/main" type="title" preserve="1">
   <p:cSld name="Title Slide">
@@ -851,7 +936,7 @@
           <a:p>
             <a:fld id="{F177A104-0C0B-4348-9A89-F5D228FCF8A6}" type="datetimeFigureOut">
               <a:rPr lang="en-US" smtClean="0"/>
-              <a:t>12/4/2017</a:t>
+              <a:t>12/7/2017</a:t>
             </a:fld>
             <a:endParaRPr lang="en-US"/>
           </a:p>
@@ -1019,7 +1104,7 @@
           <a:p>
             <a:fld id="{F177A104-0C0B-4348-9A89-F5D228FCF8A6}" type="datetimeFigureOut">
               <a:rPr lang="en-US" smtClean="0"/>
-              <a:t>12/4/2017</a:t>
+              <a:t>12/7/2017</a:t>
             </a:fld>
             <a:endParaRPr lang="en-US"/>
           </a:p>
@@ -1197,7 +1282,7 @@
           <a:p>
             <a:fld id="{F177A104-0C0B-4348-9A89-F5D228FCF8A6}" type="datetimeFigureOut">
               <a:rPr lang="en-US" smtClean="0"/>
-              <a:t>12/4/2017</a:t>
+              <a:t>12/7/2017</a:t>
             </a:fld>
             <a:endParaRPr lang="en-US"/>
           </a:p>
@@ -1365,7 +1450,7 @@
           <a:p>
             <a:fld id="{F177A104-0C0B-4348-9A89-F5D228FCF8A6}" type="datetimeFigureOut">
               <a:rPr lang="en-US" smtClean="0"/>
-              <a:t>12/4/2017</a:t>
+              <a:t>12/7/2017</a:t>
             </a:fld>
             <a:endParaRPr lang="en-US"/>
           </a:p>
@@ -1610,7 +1695,7 @@
           <a:p>
             <a:fld id="{F177A104-0C0B-4348-9A89-F5D228FCF8A6}" type="datetimeFigureOut">
               <a:rPr lang="en-US" smtClean="0"/>
-              <a:t>12/4/2017</a:t>
+              <a:t>12/7/2017</a:t>
             </a:fld>
             <a:endParaRPr lang="en-US"/>
           </a:p>
@@ -1839,7 +1924,7 @@
           <a:p>
             <a:fld id="{F177A104-0C0B-4348-9A89-F5D228FCF8A6}" type="datetimeFigureOut">
               <a:rPr lang="en-US" smtClean="0"/>
-              <a:t>12/4/2017</a:t>
+              <a:t>12/7/2017</a:t>
             </a:fld>
             <a:endParaRPr lang="en-US"/>
           </a:p>
@@ -2203,7 +2288,7 @@
           <a:p>
             <a:fld id="{F177A104-0C0B-4348-9A89-F5D228FCF8A6}" type="datetimeFigureOut">
               <a:rPr lang="en-US" smtClean="0"/>
-              <a:t>12/4/2017</a:t>
+              <a:t>12/7/2017</a:t>
             </a:fld>
             <a:endParaRPr lang="en-US"/>
           </a:p>
@@ -2320,7 +2405,7 @@
           <a:p>
             <a:fld id="{F177A104-0C0B-4348-9A89-F5D228FCF8A6}" type="datetimeFigureOut">
               <a:rPr lang="en-US" smtClean="0"/>
-              <a:t>12/4/2017</a:t>
+              <a:t>12/7/2017</a:t>
             </a:fld>
             <a:endParaRPr lang="en-US"/>
           </a:p>
@@ -2415,7 +2500,7 @@
           <a:p>
             <a:fld id="{F177A104-0C0B-4348-9A89-F5D228FCF8A6}" type="datetimeFigureOut">
               <a:rPr lang="en-US" smtClean="0"/>
-              <a:t>12/4/2017</a:t>
+              <a:t>12/7/2017</a:t>
             </a:fld>
             <a:endParaRPr lang="en-US"/>
           </a:p>
@@ -2690,7 +2775,7 @@
           <a:p>
             <a:fld id="{F177A104-0C0B-4348-9A89-F5D228FCF8A6}" type="datetimeFigureOut">
               <a:rPr lang="en-US" smtClean="0"/>
-              <a:t>12/4/2017</a:t>
+              <a:t>12/7/2017</a:t>
             </a:fld>
             <a:endParaRPr lang="en-US"/>
           </a:p>
@@ -2942,7 +3027,7 @@
           <a:p>
             <a:fld id="{F177A104-0C0B-4348-9A89-F5D228FCF8A6}" type="datetimeFigureOut">
               <a:rPr lang="en-US" smtClean="0"/>
-              <a:t>12/4/2017</a:t>
+              <a:t>12/7/2017</a:t>
             </a:fld>
             <a:endParaRPr lang="en-US"/>
           </a:p>
@@ -3153,7 +3238,7 @@
           <a:p>
             <a:fld id="{F177A104-0C0B-4348-9A89-F5D228FCF8A6}" type="datetimeFigureOut">
               <a:rPr lang="en-US" smtClean="0"/>
-              <a:t>12/4/2017</a:t>
+              <a:t>12/7/2017</a:t>
             </a:fld>
             <a:endParaRPr lang="en-US"/>
           </a:p>
@@ -4090,12 +4175,12 @@
         <p:spPr>
           <a:xfrm>
             <a:off x="838200" y="1255222"/>
-            <a:ext cx="10515600" cy="4921741"/>
+            <a:ext cx="10515600" cy="5350851"/>
           </a:xfrm>
         </p:spPr>
         <p:txBody>
           <a:bodyPr>
-            <a:normAutofit/>
+            <a:normAutofit fontScale="92500" lnSpcReduction="10000"/>
           </a:bodyPr>
           <a:lstStyle/>
           <a:p>
@@ -4104,11 +4189,15 @@
               <a:t>Train the model - </a:t>
             </a:r>
             <a:r>
-              <a:rPr lang="en-US" dirty="0">
+              <a:rPr lang="en-US" dirty="0" smtClean="0">
                 <a:hlinkClick r:id="rId3"/>
               </a:rPr>
               <a:t>TransferLearningP.py</a:t>
             </a:r>
+            <a:r>
+              <a:rPr lang="en-US" dirty="0" smtClean="0"/>
+              <a:t>   Requires GPU</a:t>
+            </a:r>
             <a:endParaRPr lang="en-US" dirty="0"/>
           </a:p>
           <a:p>
@@ -4166,7 +4255,7 @@
           <a:p>
             <a:r>
               <a:rPr lang="en-US" dirty="0" smtClean="0"/>
-              <a:t>Use </a:t>
+              <a:t>Evaluate </a:t>
             </a:r>
             <a:r>
               <a:rPr lang="en-US" dirty="0"/>
@@ -4182,6 +4271,10 @@
               </a:rPr>
               <a:t>tnc_label_evaluate.py</a:t>
             </a:r>
+            <a:r>
+              <a:rPr lang="en-US" dirty="0" smtClean="0"/>
+              <a:t>   Can run on CPU-only</a:t>
+            </a:r>
             <a:endParaRPr lang="en-US" dirty="0"/>
           </a:p>
           <a:p>
@@ -4216,8 +4309,50 @@
             <a:pPr lvl="1"/>
             <a:r>
               <a:rPr lang="en-US" dirty="0" smtClean="0"/>
-              <a:t>Save predictions to EvalOutput.txt file</a:t>
-            </a:r>
+              <a:t>Save predictions to EvalOutput.txt </a:t>
+            </a:r>
+            <a:r>
+              <a:rPr lang="en-US" dirty="0" smtClean="0"/>
+              <a:t>file</a:t>
+            </a:r>
+          </a:p>
+          <a:p>
+            <a:pPr lvl="1"/>
+            <a:endParaRPr lang="en-US" dirty="0" smtClean="0"/>
+          </a:p>
+          <a:p>
+            <a:r>
+              <a:rPr lang="en-US" dirty="0" smtClean="0"/>
+              <a:t>Publish Web API and the model to Azure App Service</a:t>
+            </a:r>
+          </a:p>
+          <a:p>
+            <a:pPr lvl="1"/>
+            <a:r>
+              <a:rPr lang="en-US" dirty="0" smtClean="0"/>
+              <a:t>Created a ASP Web API wrapper for </a:t>
+            </a:r>
+            <a:r>
+              <a:rPr lang="en-US" smtClean="0"/>
+              <a:t>the model</a:t>
+            </a:r>
+            <a:endParaRPr lang="en-US" dirty="0"/>
+          </a:p>
+          <a:p>
+            <a:pPr lvl="1"/>
+            <a:r>
+              <a:rPr lang="en-US" dirty="0" smtClean="0">
+                <a:hlinkClick r:id="rId5"/>
+              </a:rPr>
+              <a:t>http://cntkazuretutorial0120171207.azurewebsites.net/api/values</a:t>
+            </a:r>
+            <a:r>
+              <a:rPr lang="en-US" dirty="0" smtClean="0"/>
+              <a:t> </a:t>
+            </a:r>
+          </a:p>
+          <a:p>
+            <a:pPr lvl="1"/>
             <a:endParaRPr lang="en-US" dirty="0"/>
           </a:p>
           <a:p>
@@ -4245,6 +4380,681 @@
     <p:extLst>
       <p:ext uri="{BB962C8B-B14F-4D97-AF65-F5344CB8AC3E}">
         <p14:creationId xmlns:p14="http://schemas.microsoft.com/office/powerpoint/2010/main" val="2958127985"/>
+      </p:ext>
+    </p:extLst>
+  </p:cSld>
+  <p:clrMapOvr>
+    <a:masterClrMapping/>
+  </p:clrMapOvr>
+</p:sld>
+</file>
+
+<file path=ppt/slides/slide4.xml><?xml version="1.0" encoding="utf-8"?>
+<p:sld xmlns:a="http://schemas.openxmlformats.org/drawingml/2006/main" xmlns:r="http://schemas.openxmlformats.org/officeDocument/2006/relationships" xmlns:p="http://schemas.openxmlformats.org/presentationml/2006/main">
+  <p:cSld>
+    <p:spTree>
+      <p:nvGrpSpPr>
+        <p:cNvPr id="1" name=""/>
+        <p:cNvGrpSpPr/>
+        <p:nvPr/>
+      </p:nvGrpSpPr>
+      <p:grpSpPr>
+        <a:xfrm>
+          <a:off x="0" y="0"/>
+          <a:ext cx="0" cy="0"/>
+          <a:chOff x="0" y="0"/>
+          <a:chExt cx="0" cy="0"/>
+        </a:xfrm>
+      </p:grpSpPr>
+      <p:sp>
+        <p:nvSpPr>
+          <p:cNvPr id="2" name="Title 1"/>
+          <p:cNvSpPr>
+            <a:spLocks noGrp="1"/>
+          </p:cNvSpPr>
+          <p:nvPr>
+            <p:ph type="title"/>
+          </p:nvPr>
+        </p:nvSpPr>
+        <p:spPr>
+          <a:xfrm>
+            <a:off x="838200" y="365126"/>
+            <a:ext cx="10515600" cy="723842"/>
+          </a:xfrm>
+        </p:spPr>
+        <p:txBody>
+          <a:bodyPr/>
+          <a:lstStyle/>
+          <a:p>
+            <a:r>
+              <a:rPr lang="en-US" dirty="0"/>
+              <a:t>Task B CNTK – Project Status </a:t>
+            </a:r>
+            <a:r>
+              <a:rPr lang="en-US" dirty="0" smtClean="0"/>
+              <a:t>2017/12/08</a:t>
+            </a:r>
+            <a:endParaRPr lang="en-US" dirty="0"/>
+          </a:p>
+        </p:txBody>
+      </p:sp>
+      <p:sp>
+        <p:nvSpPr>
+          <p:cNvPr id="5" name="Rectangle 4"/>
+          <p:cNvSpPr/>
+          <p:nvPr/>
+        </p:nvSpPr>
+        <p:spPr>
+          <a:xfrm>
+            <a:off x="376505" y="1705247"/>
+            <a:ext cx="2427316" cy="3574472"/>
+          </a:xfrm>
+          <a:prstGeom prst="rect">
+            <a:avLst/>
+          </a:prstGeom>
+          <a:solidFill>
+            <a:schemeClr val="accent1">
+              <a:lumMod val="20000"/>
+              <a:lumOff val="80000"/>
+            </a:schemeClr>
+          </a:solidFill>
+        </p:spPr>
+        <p:style>
+          <a:lnRef idx="2">
+            <a:schemeClr val="accent1">
+              <a:shade val="50000"/>
+            </a:schemeClr>
+          </a:lnRef>
+          <a:fillRef idx="1">
+            <a:schemeClr val="accent1"/>
+          </a:fillRef>
+          <a:effectRef idx="0">
+            <a:schemeClr val="accent1"/>
+          </a:effectRef>
+          <a:fontRef idx="minor">
+            <a:schemeClr val="lt1"/>
+          </a:fontRef>
+        </p:style>
+        <p:txBody>
+          <a:bodyPr rtlCol="0" anchor="ctr"/>
+          <a:lstStyle/>
+          <a:p>
+            <a:pPr algn="ctr"/>
+            <a:endParaRPr lang="en-US"/>
+          </a:p>
+        </p:txBody>
+      </p:sp>
+      <p:sp>
+        <p:nvSpPr>
+          <p:cNvPr id="6" name="Rectangle 5"/>
+          <p:cNvSpPr/>
+          <p:nvPr/>
+        </p:nvSpPr>
+        <p:spPr>
+          <a:xfrm>
+            <a:off x="583112" y="2579007"/>
+            <a:ext cx="2119683" cy="646331"/>
+          </a:xfrm>
+          <a:prstGeom prst="rect">
+            <a:avLst/>
+          </a:prstGeom>
+        </p:spPr>
+        <p:txBody>
+          <a:bodyPr wrap="none">
+            <a:spAutoFit/>
+          </a:bodyPr>
+          <a:lstStyle/>
+          <a:p>
+            <a:r>
+              <a:rPr lang="en-US" dirty="0"/>
+              <a:t>Train the </a:t>
+            </a:r>
+            <a:r>
+              <a:rPr lang="en-US" dirty="0" smtClean="0"/>
+              <a:t>model</a:t>
+            </a:r>
+          </a:p>
+          <a:p>
+            <a:r>
+              <a:rPr lang="en-US" dirty="0" smtClean="0">
+                <a:hlinkClick r:id="rId3"/>
+              </a:rPr>
+              <a:t>TransferLearningP.py</a:t>
+            </a:r>
+            <a:endParaRPr lang="en-US" dirty="0"/>
+          </a:p>
+        </p:txBody>
+      </p:sp>
+      <p:sp>
+        <p:nvSpPr>
+          <p:cNvPr id="7" name="Rectangle 6"/>
+          <p:cNvSpPr/>
+          <p:nvPr/>
+        </p:nvSpPr>
+        <p:spPr>
+          <a:xfrm>
+            <a:off x="872583" y="4763193"/>
+            <a:ext cx="1218282" cy="369332"/>
+          </a:xfrm>
+          <a:prstGeom prst="rect">
+            <a:avLst/>
+          </a:prstGeom>
+        </p:spPr>
+        <p:txBody>
+          <a:bodyPr wrap="none">
+            <a:spAutoFit/>
+          </a:bodyPr>
+          <a:lstStyle/>
+          <a:p>
+            <a:r>
+              <a:rPr lang="en-US" dirty="0" smtClean="0"/>
+              <a:t>Local GPUs</a:t>
+            </a:r>
+          </a:p>
+        </p:txBody>
+      </p:sp>
+      <p:sp>
+        <p:nvSpPr>
+          <p:cNvPr id="10" name="Flowchart: Document 9"/>
+          <p:cNvSpPr/>
+          <p:nvPr/>
+        </p:nvSpPr>
+        <p:spPr>
+          <a:xfrm>
+            <a:off x="4552007" y="2006931"/>
+            <a:ext cx="2585910" cy="1537855"/>
+          </a:xfrm>
+          <a:prstGeom prst="flowChartDocument">
+            <a:avLst/>
+          </a:prstGeom>
+          <a:solidFill>
+            <a:schemeClr val="accent1">
+              <a:lumMod val="40000"/>
+              <a:lumOff val="60000"/>
+            </a:schemeClr>
+          </a:solidFill>
+        </p:spPr>
+        <p:style>
+          <a:lnRef idx="2">
+            <a:schemeClr val="accent1">
+              <a:shade val="50000"/>
+            </a:schemeClr>
+          </a:lnRef>
+          <a:fillRef idx="1">
+            <a:schemeClr val="accent1"/>
+          </a:fillRef>
+          <a:effectRef idx="0">
+            <a:schemeClr val="accent1"/>
+          </a:effectRef>
+          <a:fontRef idx="minor">
+            <a:schemeClr val="lt1"/>
+          </a:fontRef>
+        </p:style>
+        <p:txBody>
+          <a:bodyPr rtlCol="0" anchor="ctr"/>
+          <a:lstStyle/>
+          <a:p>
+            <a:pPr algn="ctr"/>
+            <a:endParaRPr lang="en-US"/>
+          </a:p>
+        </p:txBody>
+      </p:sp>
+      <p:sp>
+        <p:nvSpPr>
+          <p:cNvPr id="9" name="Rectangle 8"/>
+          <p:cNvSpPr/>
+          <p:nvPr/>
+        </p:nvSpPr>
+        <p:spPr>
+          <a:xfrm>
+            <a:off x="4643992" y="2535326"/>
+            <a:ext cx="2401940" cy="369332"/>
+          </a:xfrm>
+          <a:prstGeom prst="rect">
+            <a:avLst/>
+          </a:prstGeom>
+        </p:spPr>
+        <p:txBody>
+          <a:bodyPr wrap="none">
+            <a:spAutoFit/>
+          </a:bodyPr>
+          <a:lstStyle/>
+          <a:p>
+            <a:r>
+              <a:rPr lang="en-US" dirty="0" err="1"/>
+              <a:t>TransferLearning.model</a:t>
+            </a:r>
+            <a:endParaRPr lang="en-US" dirty="0" smtClean="0"/>
+          </a:p>
+        </p:txBody>
+      </p:sp>
+      <p:sp>
+        <p:nvSpPr>
+          <p:cNvPr id="11" name="Right Arrow 10"/>
+          <p:cNvSpPr/>
+          <p:nvPr/>
+        </p:nvSpPr>
+        <p:spPr>
+          <a:xfrm>
+            <a:off x="2872308" y="2311258"/>
+            <a:ext cx="1606376" cy="535497"/>
+          </a:xfrm>
+          <a:prstGeom prst="rightArrow">
+            <a:avLst/>
+          </a:prstGeom>
+        </p:spPr>
+        <p:style>
+          <a:lnRef idx="2">
+            <a:schemeClr val="accent1">
+              <a:shade val="50000"/>
+            </a:schemeClr>
+          </a:lnRef>
+          <a:fillRef idx="1">
+            <a:schemeClr val="accent1"/>
+          </a:fillRef>
+          <a:effectRef idx="0">
+            <a:schemeClr val="accent1"/>
+          </a:effectRef>
+          <a:fontRef idx="minor">
+            <a:schemeClr val="lt1"/>
+          </a:fontRef>
+        </p:style>
+        <p:txBody>
+          <a:bodyPr rtlCol="0" anchor="ctr"/>
+          <a:lstStyle/>
+          <a:p>
+            <a:pPr algn="ctr"/>
+            <a:endParaRPr lang="en-US"/>
+          </a:p>
+        </p:txBody>
+      </p:sp>
+      <p:sp>
+        <p:nvSpPr>
+          <p:cNvPr id="12" name="Rectangle 11"/>
+          <p:cNvSpPr/>
+          <p:nvPr/>
+        </p:nvSpPr>
+        <p:spPr>
+          <a:xfrm>
+            <a:off x="2872308" y="2846755"/>
+            <a:ext cx="1375698" cy="577081"/>
+          </a:xfrm>
+          <a:prstGeom prst="rect">
+            <a:avLst/>
+          </a:prstGeom>
+        </p:spPr>
+        <p:txBody>
+          <a:bodyPr wrap="none">
+            <a:spAutoFit/>
+          </a:bodyPr>
+          <a:lstStyle/>
+          <a:p>
+            <a:r>
+              <a:rPr lang="en-US" sz="1050" dirty="0" smtClean="0"/>
+              <a:t>Save the network and</a:t>
+            </a:r>
+          </a:p>
+          <a:p>
+            <a:r>
+              <a:rPr lang="en-US" sz="1050" dirty="0" smtClean="0"/>
+              <a:t>learned parameters </a:t>
+            </a:r>
+          </a:p>
+          <a:p>
+            <a:r>
+              <a:rPr lang="en-US" sz="1050" dirty="0" smtClean="0"/>
+              <a:t>to a CNTK model file</a:t>
+            </a:r>
+          </a:p>
+        </p:txBody>
+      </p:sp>
+      <p:sp>
+        <p:nvSpPr>
+          <p:cNvPr id="13" name="Rectangle 12"/>
+          <p:cNvSpPr/>
+          <p:nvPr/>
+        </p:nvSpPr>
+        <p:spPr>
+          <a:xfrm>
+            <a:off x="9444133" y="1705247"/>
+            <a:ext cx="2583025" cy="4406303"/>
+          </a:xfrm>
+          <a:prstGeom prst="rect">
+            <a:avLst/>
+          </a:prstGeom>
+          <a:solidFill>
+            <a:schemeClr val="accent1">
+              <a:lumMod val="20000"/>
+              <a:lumOff val="80000"/>
+            </a:schemeClr>
+          </a:solidFill>
+        </p:spPr>
+        <p:style>
+          <a:lnRef idx="2">
+            <a:schemeClr val="accent1">
+              <a:shade val="50000"/>
+            </a:schemeClr>
+          </a:lnRef>
+          <a:fillRef idx="1">
+            <a:schemeClr val="accent1"/>
+          </a:fillRef>
+          <a:effectRef idx="0">
+            <a:schemeClr val="accent1"/>
+          </a:effectRef>
+          <a:fontRef idx="minor">
+            <a:schemeClr val="lt1"/>
+          </a:fontRef>
+        </p:style>
+        <p:txBody>
+          <a:bodyPr rtlCol="0" anchor="ctr"/>
+          <a:lstStyle/>
+          <a:p>
+            <a:pPr algn="ctr"/>
+            <a:endParaRPr lang="en-US"/>
+          </a:p>
+        </p:txBody>
+      </p:sp>
+      <p:sp>
+        <p:nvSpPr>
+          <p:cNvPr id="14" name="Rectangle 13"/>
+          <p:cNvSpPr/>
+          <p:nvPr/>
+        </p:nvSpPr>
+        <p:spPr>
+          <a:xfrm>
+            <a:off x="4499720" y="3763918"/>
+            <a:ext cx="2606955" cy="2198344"/>
+          </a:xfrm>
+          <a:prstGeom prst="rect">
+            <a:avLst/>
+          </a:prstGeom>
+          <a:solidFill>
+            <a:schemeClr val="accent1">
+              <a:lumMod val="20000"/>
+              <a:lumOff val="80000"/>
+            </a:schemeClr>
+          </a:solidFill>
+        </p:spPr>
+        <p:style>
+          <a:lnRef idx="2">
+            <a:schemeClr val="accent1">
+              <a:shade val="50000"/>
+            </a:schemeClr>
+          </a:lnRef>
+          <a:fillRef idx="1">
+            <a:schemeClr val="accent1"/>
+          </a:fillRef>
+          <a:effectRef idx="0">
+            <a:schemeClr val="accent1"/>
+          </a:effectRef>
+          <a:fontRef idx="minor">
+            <a:schemeClr val="lt1"/>
+          </a:fontRef>
+        </p:style>
+        <p:txBody>
+          <a:bodyPr rtlCol="0" anchor="ctr"/>
+          <a:lstStyle/>
+          <a:p>
+            <a:pPr algn="ctr"/>
+            <a:endParaRPr lang="en-US"/>
+          </a:p>
+        </p:txBody>
+      </p:sp>
+      <p:sp>
+        <p:nvSpPr>
+          <p:cNvPr id="15" name="Rectangle 14"/>
+          <p:cNvSpPr/>
+          <p:nvPr/>
+        </p:nvSpPr>
+        <p:spPr>
+          <a:xfrm>
+            <a:off x="4704735" y="4344173"/>
+            <a:ext cx="2401940" cy="923330"/>
+          </a:xfrm>
+          <a:prstGeom prst="rect">
+            <a:avLst/>
+          </a:prstGeom>
+        </p:spPr>
+        <p:txBody>
+          <a:bodyPr wrap="none">
+            <a:spAutoFit/>
+          </a:bodyPr>
+          <a:lstStyle/>
+          <a:p>
+            <a:r>
+              <a:rPr lang="en-US" dirty="0" smtClean="0">
+                <a:hlinkClick r:id="rId4"/>
+              </a:rPr>
+              <a:t>ASP.NET Web API</a:t>
+            </a:r>
+            <a:endParaRPr lang="en-US" dirty="0" smtClean="0"/>
+          </a:p>
+          <a:p>
+            <a:r>
+              <a:rPr lang="en-US" dirty="0" smtClean="0"/>
+              <a:t>Wrapper for</a:t>
+            </a:r>
+          </a:p>
+          <a:p>
+            <a:r>
+              <a:rPr lang="en-US" dirty="0" err="1" smtClean="0"/>
+              <a:t>TransferLearning.model</a:t>
+            </a:r>
+            <a:endParaRPr lang="en-US" dirty="0" smtClean="0"/>
+          </a:p>
+        </p:txBody>
+      </p:sp>
+      <p:sp>
+        <p:nvSpPr>
+          <p:cNvPr id="16" name="Right Arrow 15"/>
+          <p:cNvSpPr/>
+          <p:nvPr/>
+        </p:nvSpPr>
+        <p:spPr>
+          <a:xfrm>
+            <a:off x="7303225" y="2776210"/>
+            <a:ext cx="2048924" cy="370389"/>
+          </a:xfrm>
+          <a:prstGeom prst="rightArrow">
+            <a:avLst/>
+          </a:prstGeom>
+        </p:spPr>
+        <p:style>
+          <a:lnRef idx="2">
+            <a:schemeClr val="accent1">
+              <a:shade val="50000"/>
+            </a:schemeClr>
+          </a:lnRef>
+          <a:fillRef idx="1">
+            <a:schemeClr val="accent1"/>
+          </a:fillRef>
+          <a:effectRef idx="0">
+            <a:schemeClr val="accent1"/>
+          </a:effectRef>
+          <a:fontRef idx="minor">
+            <a:schemeClr val="lt1"/>
+          </a:fontRef>
+        </p:style>
+        <p:txBody>
+          <a:bodyPr rtlCol="0" anchor="ctr"/>
+          <a:lstStyle/>
+          <a:p>
+            <a:pPr algn="ctr"/>
+            <a:endParaRPr lang="en-US"/>
+          </a:p>
+        </p:txBody>
+      </p:sp>
+      <p:sp>
+        <p:nvSpPr>
+          <p:cNvPr id="17" name="Right Arrow 16"/>
+          <p:cNvSpPr/>
+          <p:nvPr/>
+        </p:nvSpPr>
+        <p:spPr>
+          <a:xfrm>
+            <a:off x="7276501" y="4075113"/>
+            <a:ext cx="2075648" cy="370389"/>
+          </a:xfrm>
+          <a:prstGeom prst="rightArrow">
+            <a:avLst/>
+          </a:prstGeom>
+        </p:spPr>
+        <p:style>
+          <a:lnRef idx="2">
+            <a:schemeClr val="accent1">
+              <a:shade val="50000"/>
+            </a:schemeClr>
+          </a:lnRef>
+          <a:fillRef idx="1">
+            <a:schemeClr val="accent1"/>
+          </a:fillRef>
+          <a:effectRef idx="0">
+            <a:schemeClr val="accent1"/>
+          </a:effectRef>
+          <a:fontRef idx="minor">
+            <a:schemeClr val="lt1"/>
+          </a:fontRef>
+        </p:style>
+        <p:txBody>
+          <a:bodyPr rtlCol="0" anchor="ctr"/>
+          <a:lstStyle/>
+          <a:p>
+            <a:pPr algn="ctr"/>
+            <a:endParaRPr lang="en-US"/>
+          </a:p>
+        </p:txBody>
+      </p:sp>
+      <p:sp>
+        <p:nvSpPr>
+          <p:cNvPr id="18" name="Rectangle 17"/>
+          <p:cNvSpPr/>
+          <p:nvPr/>
+        </p:nvSpPr>
+        <p:spPr>
+          <a:xfrm>
+            <a:off x="7491398" y="3331317"/>
+            <a:ext cx="1526380" cy="577081"/>
+          </a:xfrm>
+          <a:prstGeom prst="rect">
+            <a:avLst/>
+          </a:prstGeom>
+        </p:spPr>
+        <p:txBody>
+          <a:bodyPr wrap="none">
+            <a:spAutoFit/>
+          </a:bodyPr>
+          <a:lstStyle/>
+          <a:p>
+            <a:r>
+              <a:rPr lang="en-US" sz="1050" dirty="0" smtClean="0"/>
+              <a:t>Publish the web API </a:t>
+            </a:r>
+          </a:p>
+          <a:p>
+            <a:r>
+              <a:rPr lang="en-US" sz="1050" dirty="0" smtClean="0"/>
+              <a:t>(including the model) to </a:t>
+            </a:r>
+          </a:p>
+          <a:p>
+            <a:r>
+              <a:rPr lang="en-US" sz="1050" dirty="0" smtClean="0"/>
+              <a:t>Azure App Service</a:t>
+            </a:r>
+          </a:p>
+        </p:txBody>
+      </p:sp>
+      <p:sp>
+        <p:nvSpPr>
+          <p:cNvPr id="19" name="Rectangle 18"/>
+          <p:cNvSpPr/>
+          <p:nvPr/>
+        </p:nvSpPr>
+        <p:spPr>
+          <a:xfrm>
+            <a:off x="10197676" y="4918673"/>
+            <a:ext cx="1075936" cy="369332"/>
+          </a:xfrm>
+          <a:prstGeom prst="rect">
+            <a:avLst/>
+          </a:prstGeom>
+        </p:spPr>
+        <p:txBody>
+          <a:bodyPr wrap="none">
+            <a:spAutoFit/>
+          </a:bodyPr>
+          <a:lstStyle/>
+          <a:p>
+            <a:r>
+              <a:rPr lang="en-US" dirty="0" smtClean="0"/>
+              <a:t>CPU-Only</a:t>
+            </a:r>
+          </a:p>
+        </p:txBody>
+      </p:sp>
+      <p:sp>
+        <p:nvSpPr>
+          <p:cNvPr id="20" name="Rectangle 19"/>
+          <p:cNvSpPr/>
+          <p:nvPr/>
+        </p:nvSpPr>
+        <p:spPr>
+          <a:xfrm>
+            <a:off x="9796349" y="5487320"/>
+            <a:ext cx="1878591" cy="369332"/>
+          </a:xfrm>
+          <a:prstGeom prst="rect">
+            <a:avLst/>
+          </a:prstGeom>
+        </p:spPr>
+        <p:txBody>
+          <a:bodyPr wrap="none">
+            <a:spAutoFit/>
+          </a:bodyPr>
+          <a:lstStyle/>
+          <a:p>
+            <a:r>
+              <a:rPr lang="en-US" dirty="0" smtClean="0"/>
+              <a:t>Azure App Service</a:t>
+            </a:r>
+          </a:p>
+        </p:txBody>
+      </p:sp>
+      <p:sp>
+        <p:nvSpPr>
+          <p:cNvPr id="21" name="Rectangle 20"/>
+          <p:cNvSpPr/>
+          <p:nvPr/>
+        </p:nvSpPr>
+        <p:spPr>
+          <a:xfrm>
+            <a:off x="9992118" y="2803780"/>
+            <a:ext cx="1670398" cy="369332"/>
+          </a:xfrm>
+          <a:prstGeom prst="rect">
+            <a:avLst/>
+          </a:prstGeom>
+        </p:spPr>
+        <p:txBody>
+          <a:bodyPr wrap="square">
+            <a:spAutoFit/>
+          </a:bodyPr>
+          <a:lstStyle/>
+          <a:p>
+            <a:r>
+              <a:rPr lang="en-US" dirty="0" smtClean="0">
+                <a:hlinkClick r:id="rId5"/>
+              </a:rPr>
+              <a:t>TNC Label API</a:t>
+            </a:r>
+            <a:endParaRPr lang="en-US" dirty="0"/>
+          </a:p>
+        </p:txBody>
+      </p:sp>
+    </p:spTree>
+    <p:extLst>
+      <p:ext uri="{BB962C8B-B14F-4D97-AF65-F5344CB8AC3E}">
+        <p14:creationId xmlns:p14="http://schemas.microsoft.com/office/powerpoint/2010/main" val="1153851061"/>
       </p:ext>
     </p:extLst>
   </p:cSld>

</xml_diff>